<commit_message>
Draft completed with figures, tables
</commit_message>
<xml_diff>
--- a/analysis/Rcode_plots/edit_figures.pptx
+++ b/analysis/Rcode_plots/edit_figures.pptx
@@ -195,7 +195,7 @@
           <a:p>
             <a:fld id="{B68487BB-9814-3442-A4D2-A497D91B2A40}" type="datetimeFigureOut">
               <a:rPr lang="en-US" smtClean="0"/>
-              <a:t>1/18/14</a:t>
+              <a:t>1/19/14</a:t>
             </a:fld>
             <a:endParaRPr lang="en-US"/>
           </a:p>
@@ -509,7 +509,17 @@
           <a:p>
             <a:r>
               <a:rPr lang="en-US" dirty="0" smtClean="0"/>
-              <a:t>1/18. Removed R’s main and added own.</a:t>
+              <a:t>1/18. Removed R’s main and added own</a:t>
+            </a:r>
+            <a:r>
+              <a:rPr lang="en-US" dirty="0" smtClean="0"/>
+              <a:t>.</a:t>
+            </a:r>
+          </a:p>
+          <a:p>
+            <a:r>
+              <a:rPr lang="en-US" dirty="0" smtClean="0"/>
+              <a:t>1/19. Added ABC</a:t>
             </a:r>
             <a:endParaRPr lang="en-US" dirty="0"/>
           </a:p>
@@ -614,8 +624,36 @@
             </a:pPr>
             <a:r>
               <a:rPr lang="en-US" dirty="0" smtClean="0"/>
-              <a:t>1/18. Removed R’s main and added own.</a:t>
-            </a:r>
+              <a:t>1/18. Removed R’s main and added own</a:t>
+            </a:r>
+            <a:r>
+              <a:rPr lang="en-US" dirty="0" smtClean="0"/>
+              <a:t>.</a:t>
+            </a:r>
+          </a:p>
+          <a:p>
+            <a:pPr marL="0" marR="0" indent="0" algn="l" defTabSz="457200" rtl="0" eaLnBrk="1" fontAlgn="auto" latinLnBrk="0" hangingPunct="1">
+              <a:lnSpc>
+                <a:spcPct val="100000"/>
+              </a:lnSpc>
+              <a:spcBef>
+                <a:spcPts val="0"/>
+              </a:spcBef>
+              <a:spcAft>
+                <a:spcPts val="0"/>
+              </a:spcAft>
+              <a:buClrTx/>
+              <a:buSzTx/>
+              <a:buFontTx/>
+              <a:buNone/>
+              <a:tabLst/>
+              <a:defRPr/>
+            </a:pPr>
+            <a:r>
+              <a:rPr lang="en-US" dirty="0" smtClean="0"/>
+              <a:t>1/19. Added AB</a:t>
+            </a:r>
+            <a:endParaRPr lang="en-US" dirty="0" smtClean="0"/>
           </a:p>
           <a:p>
             <a:endParaRPr lang="en-US" dirty="0"/>
@@ -649,6 +687,213 @@
     <p:extLst>
       <p:ext uri="{BB962C8B-B14F-4D97-AF65-F5344CB8AC3E}">
         <p14:creationId xmlns:p14="http://schemas.microsoft.com/office/powerpoint/2010/main" val="3575915178"/>
+      </p:ext>
+    </p:extLst>
+  </p:cSld>
+  <p:clrMapOvr>
+    <a:masterClrMapping/>
+  </p:clrMapOvr>
+</p:notes>
+</file>
+
+<file path=ppt/notesSlides/notesSlide3.xml><?xml version="1.0" encoding="utf-8"?>
+<p:notes xmlns:a="http://schemas.openxmlformats.org/drawingml/2006/main" xmlns:r="http://schemas.openxmlformats.org/officeDocument/2006/relationships" xmlns:p="http://schemas.openxmlformats.org/presentationml/2006/main">
+  <p:cSld>
+    <p:spTree>
+      <p:nvGrpSpPr>
+        <p:cNvPr id="1" name=""/>
+        <p:cNvGrpSpPr/>
+        <p:nvPr/>
+      </p:nvGrpSpPr>
+      <p:grpSpPr>
+        <a:xfrm>
+          <a:off x="0" y="0"/>
+          <a:ext cx="0" cy="0"/>
+          <a:chOff x="0" y="0"/>
+          <a:chExt cx="0" cy="0"/>
+        </a:xfrm>
+      </p:grpSpPr>
+      <p:sp>
+        <p:nvSpPr>
+          <p:cNvPr id="2" name="Slide Image Placeholder 1"/>
+          <p:cNvSpPr>
+            <a:spLocks noGrp="1" noRot="1" noChangeAspect="1"/>
+          </p:cNvSpPr>
+          <p:nvPr>
+            <p:ph type="sldImg"/>
+          </p:nvPr>
+        </p:nvSpPr>
+        <p:spPr/>
+      </p:sp>
+      <p:sp>
+        <p:nvSpPr>
+          <p:cNvPr id="3" name="Notes Placeholder 2"/>
+          <p:cNvSpPr>
+            <a:spLocks noGrp="1"/>
+          </p:cNvSpPr>
+          <p:nvPr>
+            <p:ph type="body" idx="1"/>
+          </p:nvPr>
+        </p:nvSpPr>
+        <p:spPr/>
+        <p:txBody>
+          <a:bodyPr/>
+          <a:lstStyle/>
+          <a:p>
+            <a:r>
+              <a:rPr lang="en-US" dirty="0" smtClean="0"/>
+              <a:t>1/18</a:t>
+            </a:r>
+            <a:r>
+              <a:rPr lang="en-US" baseline="0" dirty="0" smtClean="0"/>
+              <a:t> Added 26/60 titles</a:t>
+            </a:r>
+          </a:p>
+          <a:p>
+            <a:r>
+              <a:rPr lang="en-US" baseline="0" dirty="0" smtClean="0"/>
+              <a:t>1/19. Added ABCD</a:t>
+            </a:r>
+          </a:p>
+        </p:txBody>
+      </p:sp>
+      <p:sp>
+        <p:nvSpPr>
+          <p:cNvPr id="4" name="Slide Number Placeholder 3"/>
+          <p:cNvSpPr>
+            <a:spLocks noGrp="1"/>
+          </p:cNvSpPr>
+          <p:nvPr>
+            <p:ph type="sldNum" sz="quarter" idx="10"/>
+          </p:nvPr>
+        </p:nvSpPr>
+        <p:spPr/>
+        <p:txBody>
+          <a:bodyPr/>
+          <a:lstStyle/>
+          <a:p>
+            <a:fld id="{9A8799B9-896D-0C48-BED3-284DA1D03806}" type="slidenum">
+              <a:rPr lang="en-US" smtClean="0"/>
+              <a:t>3</a:t>
+            </a:fld>
+            <a:endParaRPr lang="en-US"/>
+          </a:p>
+        </p:txBody>
+      </p:sp>
+    </p:spTree>
+    <p:extLst>
+      <p:ext uri="{BB962C8B-B14F-4D97-AF65-F5344CB8AC3E}">
+        <p14:creationId xmlns:p14="http://schemas.microsoft.com/office/powerpoint/2010/main" val="997444400"/>
+      </p:ext>
+    </p:extLst>
+  </p:cSld>
+  <p:clrMapOvr>
+    <a:masterClrMapping/>
+  </p:clrMapOvr>
+</p:notes>
+</file>
+
+<file path=ppt/notesSlides/notesSlide4.xml><?xml version="1.0" encoding="utf-8"?>
+<p:notes xmlns:a="http://schemas.openxmlformats.org/drawingml/2006/main" xmlns:r="http://schemas.openxmlformats.org/officeDocument/2006/relationships" xmlns:p="http://schemas.openxmlformats.org/presentationml/2006/main">
+  <p:cSld>
+    <p:spTree>
+      <p:nvGrpSpPr>
+        <p:cNvPr id="1" name=""/>
+        <p:cNvGrpSpPr/>
+        <p:nvPr/>
+      </p:nvGrpSpPr>
+      <p:grpSpPr>
+        <a:xfrm>
+          <a:off x="0" y="0"/>
+          <a:ext cx="0" cy="0"/>
+          <a:chOff x="0" y="0"/>
+          <a:chExt cx="0" cy="0"/>
+        </a:xfrm>
+      </p:grpSpPr>
+      <p:sp>
+        <p:nvSpPr>
+          <p:cNvPr id="2" name="Slide Image Placeholder 1"/>
+          <p:cNvSpPr>
+            <a:spLocks noGrp="1" noRot="1" noChangeAspect="1"/>
+          </p:cNvSpPr>
+          <p:nvPr>
+            <p:ph type="sldImg"/>
+          </p:nvPr>
+        </p:nvSpPr>
+        <p:spPr/>
+      </p:sp>
+      <p:sp>
+        <p:nvSpPr>
+          <p:cNvPr id="3" name="Notes Placeholder 2"/>
+          <p:cNvSpPr>
+            <a:spLocks noGrp="1"/>
+          </p:cNvSpPr>
+          <p:nvPr>
+            <p:ph type="body" idx="1"/>
+          </p:nvPr>
+        </p:nvSpPr>
+        <p:spPr/>
+        <p:txBody>
+          <a:bodyPr/>
+          <a:lstStyle/>
+          <a:p>
+            <a:r>
+              <a:rPr lang="en-US" dirty="0" smtClean="0"/>
+              <a:t>1/18.</a:t>
+            </a:r>
+            <a:r>
+              <a:rPr lang="en-US" baseline="0" dirty="0" smtClean="0"/>
+              <a:t> Added Fubar, </a:t>
+            </a:r>
+            <a:r>
+              <a:rPr lang="en-US" baseline="0" dirty="0" err="1" smtClean="0"/>
+              <a:t>Paml</a:t>
+            </a:r>
+            <a:r>
+              <a:rPr lang="en-US" baseline="0" dirty="0" smtClean="0"/>
+              <a:t> titles</a:t>
+            </a:r>
+          </a:p>
+          <a:p>
+            <a:r>
+              <a:rPr lang="en-US" baseline="0" dirty="0" smtClean="0"/>
+              <a:t>1/19. </a:t>
+            </a:r>
+            <a:r>
+              <a:rPr lang="en-US" baseline="0" smtClean="0"/>
+              <a:t>Added AB</a:t>
+            </a:r>
+            <a:endParaRPr lang="en-US"/>
+          </a:p>
+        </p:txBody>
+      </p:sp>
+      <p:sp>
+        <p:nvSpPr>
+          <p:cNvPr id="4" name="Slide Number Placeholder 3"/>
+          <p:cNvSpPr>
+            <a:spLocks noGrp="1"/>
+          </p:cNvSpPr>
+          <p:nvPr>
+            <p:ph type="sldNum" sz="quarter" idx="10"/>
+          </p:nvPr>
+        </p:nvSpPr>
+        <p:spPr/>
+        <p:txBody>
+          <a:bodyPr/>
+          <a:lstStyle/>
+          <a:p>
+            <a:fld id="{9A8799B9-896D-0C48-BED3-284DA1D03806}" type="slidenum">
+              <a:rPr lang="en-US" smtClean="0"/>
+              <a:t>4</a:t>
+            </a:fld>
+            <a:endParaRPr lang="en-US"/>
+          </a:p>
+        </p:txBody>
+      </p:sp>
+    </p:spTree>
+    <p:extLst>
+      <p:ext uri="{BB962C8B-B14F-4D97-AF65-F5344CB8AC3E}">
+        <p14:creationId xmlns:p14="http://schemas.microsoft.com/office/powerpoint/2010/main" val="1176804866"/>
       </p:ext>
     </p:extLst>
   </p:cSld>
@@ -839,7 +1084,7 @@
           <a:p>
             <a:fld id="{12FAC503-EA1F-3E4C-84BC-5AA3D60989DE}" type="datetimeFigureOut">
               <a:rPr lang="en-US" smtClean="0"/>
-              <a:t>1/18/14</a:t>
+              <a:t>1/19/14</a:t>
             </a:fld>
             <a:endParaRPr lang="en-US"/>
           </a:p>
@@ -1009,7 +1254,7 @@
           <a:p>
             <a:fld id="{12FAC503-EA1F-3E4C-84BC-5AA3D60989DE}" type="datetimeFigureOut">
               <a:rPr lang="en-US" smtClean="0"/>
-              <a:t>1/18/14</a:t>
+              <a:t>1/19/14</a:t>
             </a:fld>
             <a:endParaRPr lang="en-US"/>
           </a:p>
@@ -1189,7 +1434,7 @@
           <a:p>
             <a:fld id="{12FAC503-EA1F-3E4C-84BC-5AA3D60989DE}" type="datetimeFigureOut">
               <a:rPr lang="en-US" smtClean="0"/>
-              <a:t>1/18/14</a:t>
+              <a:t>1/19/14</a:t>
             </a:fld>
             <a:endParaRPr lang="en-US"/>
           </a:p>
@@ -1359,7 +1604,7 @@
           <a:p>
             <a:fld id="{12FAC503-EA1F-3E4C-84BC-5AA3D60989DE}" type="datetimeFigureOut">
               <a:rPr lang="en-US" smtClean="0"/>
-              <a:t>1/18/14</a:t>
+              <a:t>1/19/14</a:t>
             </a:fld>
             <a:endParaRPr lang="en-US"/>
           </a:p>
@@ -1605,7 +1850,7 @@
           <a:p>
             <a:fld id="{12FAC503-EA1F-3E4C-84BC-5AA3D60989DE}" type="datetimeFigureOut">
               <a:rPr lang="en-US" smtClean="0"/>
-              <a:t>1/18/14</a:t>
+              <a:t>1/19/14</a:t>
             </a:fld>
             <a:endParaRPr lang="en-US"/>
           </a:p>
@@ -1893,7 +2138,7 @@
           <a:p>
             <a:fld id="{12FAC503-EA1F-3E4C-84BC-5AA3D60989DE}" type="datetimeFigureOut">
               <a:rPr lang="en-US" smtClean="0"/>
-              <a:t>1/18/14</a:t>
+              <a:t>1/19/14</a:t>
             </a:fld>
             <a:endParaRPr lang="en-US"/>
           </a:p>
@@ -2315,7 +2560,7 @@
           <a:p>
             <a:fld id="{12FAC503-EA1F-3E4C-84BC-5AA3D60989DE}" type="datetimeFigureOut">
               <a:rPr lang="en-US" smtClean="0"/>
-              <a:t>1/18/14</a:t>
+              <a:t>1/19/14</a:t>
             </a:fld>
             <a:endParaRPr lang="en-US"/>
           </a:p>
@@ -2433,7 +2678,7 @@
           <a:p>
             <a:fld id="{12FAC503-EA1F-3E4C-84BC-5AA3D60989DE}" type="datetimeFigureOut">
               <a:rPr lang="en-US" smtClean="0"/>
-              <a:t>1/18/14</a:t>
+              <a:t>1/19/14</a:t>
             </a:fld>
             <a:endParaRPr lang="en-US"/>
           </a:p>
@@ -2528,7 +2773,7 @@
           <a:p>
             <a:fld id="{12FAC503-EA1F-3E4C-84BC-5AA3D60989DE}" type="datetimeFigureOut">
               <a:rPr lang="en-US" smtClean="0"/>
-              <a:t>1/18/14</a:t>
+              <a:t>1/19/14</a:t>
             </a:fld>
             <a:endParaRPr lang="en-US"/>
           </a:p>
@@ -2805,7 +3050,7 @@
           <a:p>
             <a:fld id="{12FAC503-EA1F-3E4C-84BC-5AA3D60989DE}" type="datetimeFigureOut">
               <a:rPr lang="en-US" smtClean="0"/>
-              <a:t>1/18/14</a:t>
+              <a:t>1/19/14</a:t>
             </a:fld>
             <a:endParaRPr lang="en-US"/>
           </a:p>
@@ -3058,7 +3303,7 @@
           <a:p>
             <a:fld id="{12FAC503-EA1F-3E4C-84BC-5AA3D60989DE}" type="datetimeFigureOut">
               <a:rPr lang="en-US" smtClean="0"/>
-              <a:t>1/18/14</a:t>
+              <a:t>1/19/14</a:t>
             </a:fld>
             <a:endParaRPr lang="en-US"/>
           </a:p>
@@ -3271,7 +3516,7 @@
           <a:p>
             <a:fld id="{12FAC503-EA1F-3E4C-84BC-5AA3D60989DE}" type="datetimeFigureOut">
               <a:rPr lang="en-US" smtClean="0"/>
-              <a:t>1/18/14</a:t>
+              <a:t>1/19/14</a:t>
             </a:fld>
             <a:endParaRPr lang="en-US"/>
           </a:p>
@@ -3683,8 +3928,8 @@
         </p:nvSpPr>
         <p:spPr>
           <a:xfrm>
-            <a:off x="4288692" y="1875862"/>
-            <a:ext cx="674078" cy="307777"/>
+            <a:off x="4336083" y="2037445"/>
+            <a:ext cx="674078" cy="292388"/>
           </a:xfrm>
           <a:prstGeom prst="rect">
             <a:avLst/>
@@ -3698,13 +3943,13 @@
           <a:lstStyle/>
           <a:p>
             <a:r>
-              <a:rPr lang="en-US" sz="1400" dirty="0" smtClean="0">
+              <a:rPr lang="en-US" sz="1300" dirty="0" smtClean="0">
                 <a:latin typeface="Arial"/>
                 <a:cs typeface="Arial"/>
               </a:rPr>
               <a:t>Fubar</a:t>
             </a:r>
-            <a:endParaRPr lang="en-US" sz="1400" dirty="0">
+            <a:endParaRPr lang="en-US" sz="1300" dirty="0">
               <a:latin typeface="Arial"/>
               <a:cs typeface="Arial"/>
             </a:endParaRPr>
@@ -3719,8 +3964,8 @@
         </p:nvSpPr>
         <p:spPr>
           <a:xfrm>
-            <a:off x="7156937" y="1875862"/>
-            <a:ext cx="629140" cy="307777"/>
+            <a:off x="7156937" y="2037445"/>
+            <a:ext cx="629140" cy="292388"/>
           </a:xfrm>
           <a:prstGeom prst="rect">
             <a:avLst/>
@@ -3734,13 +3979,49 @@
           <a:lstStyle/>
           <a:p>
             <a:r>
-              <a:rPr lang="en-US" sz="1400" dirty="0" err="1" smtClean="0">
+              <a:rPr lang="en-US" sz="1300" dirty="0" err="1" smtClean="0">
                 <a:latin typeface="Arial"/>
                 <a:cs typeface="Arial"/>
               </a:rPr>
               <a:t>Paml</a:t>
             </a:r>
-            <a:endParaRPr lang="en-US" sz="1400" dirty="0">
+            <a:endParaRPr lang="en-US" sz="1300" dirty="0">
+              <a:latin typeface="Arial"/>
+              <a:cs typeface="Arial"/>
+            </a:endParaRPr>
+          </a:p>
+        </p:txBody>
+      </p:sp>
+      <p:sp>
+        <p:nvSpPr>
+          <p:cNvPr id="2" name="TextBox 1"/>
+          <p:cNvSpPr txBox="1"/>
+          <p:nvPr/>
+        </p:nvSpPr>
+        <p:spPr>
+          <a:xfrm>
+            <a:off x="305048" y="1891251"/>
+            <a:ext cx="8308141" cy="292388"/>
+          </a:xfrm>
+          <a:prstGeom prst="rect">
+            <a:avLst/>
+          </a:prstGeom>
+          <a:noFill/>
+        </p:spPr>
+        <p:txBody>
+          <a:bodyPr wrap="square" rtlCol="0">
+            <a:spAutoFit/>
+          </a:bodyPr>
+          <a:lstStyle/>
+          <a:p>
+            <a:r>
+              <a:rPr lang="en-US" sz="1300" b="1" dirty="0" smtClean="0">
+                <a:latin typeface="Arial"/>
+                <a:cs typeface="Arial"/>
+              </a:rPr>
+              <a:t>A						  B						    C</a:t>
+            </a:r>
+            <a:endParaRPr lang="en-US" sz="1300" b="1" dirty="0">
               <a:latin typeface="Arial"/>
               <a:cs typeface="Arial"/>
             </a:endParaRPr>
@@ -3814,7 +4095,7 @@
         </p:nvSpPr>
         <p:spPr>
           <a:xfrm>
-            <a:off x="2451672" y="2029750"/>
+            <a:off x="2337934" y="2183638"/>
             <a:ext cx="674078" cy="307777"/>
           </a:xfrm>
           <a:prstGeom prst="rect">
@@ -3850,7 +4131,7 @@
         </p:nvSpPr>
         <p:spPr>
           <a:xfrm>
-            <a:off x="6227087" y="2029750"/>
+            <a:off x="6170218" y="2182822"/>
             <a:ext cx="629140" cy="307777"/>
           </a:xfrm>
           <a:prstGeom prst="rect">
@@ -3872,6 +4153,42 @@
               <a:t>Paml</a:t>
             </a:r>
             <a:endParaRPr lang="en-US" sz="1400" dirty="0">
+              <a:latin typeface="Arial"/>
+              <a:cs typeface="Arial"/>
+            </a:endParaRPr>
+          </a:p>
+        </p:txBody>
+      </p:sp>
+      <p:sp>
+        <p:nvSpPr>
+          <p:cNvPr id="7" name="TextBox 6"/>
+          <p:cNvSpPr txBox="1"/>
+          <p:nvPr/>
+        </p:nvSpPr>
+        <p:spPr>
+          <a:xfrm>
+            <a:off x="859460" y="2125783"/>
+            <a:ext cx="4950617" cy="307777"/>
+          </a:xfrm>
+          <a:prstGeom prst="rect">
+            <a:avLst/>
+          </a:prstGeom>
+          <a:noFill/>
+        </p:spPr>
+        <p:txBody>
+          <a:bodyPr wrap="square" rtlCol="0">
+            <a:spAutoFit/>
+          </a:bodyPr>
+          <a:lstStyle/>
+          <a:p>
+            <a:r>
+              <a:rPr lang="en-US" sz="1400" b="1" dirty="0" smtClean="0">
+                <a:latin typeface="Arial"/>
+                <a:cs typeface="Arial"/>
+              </a:rPr>
+              <a:t>A						                     B		</a:t>
+            </a:r>
+            <a:endParaRPr lang="en-US" sz="1400" b="1" dirty="0">
               <a:latin typeface="Arial"/>
               <a:cs typeface="Arial"/>
             </a:endParaRPr>
@@ -3917,7 +4234,7 @@
           <p:nvPr/>
         </p:nvPicPr>
         <p:blipFill>
-          <a:blip r:embed="rId2">
+          <a:blip r:embed="rId3">
             <a:extLst>
               <a:ext uri="{28A0092B-C50C-407E-A947-70E740481C1C}">
                 <a14:useLocalDpi xmlns:a14="http://schemas.microsoft.com/office/drawing/2010/main" val="0"/>
@@ -3946,7 +4263,7 @@
         </p:nvSpPr>
         <p:spPr>
           <a:xfrm>
-            <a:off x="3292840" y="442154"/>
+            <a:off x="3185911" y="361048"/>
             <a:ext cx="2624166" cy="323165"/>
           </a:xfrm>
           <a:prstGeom prst="rect">
@@ -3983,7 +4300,7 @@
         </p:nvSpPr>
         <p:spPr>
           <a:xfrm>
-            <a:off x="3292840" y="3652767"/>
+            <a:off x="3185911" y="3548427"/>
             <a:ext cx="2624166" cy="323165"/>
           </a:xfrm>
           <a:prstGeom prst="rect">
@@ -4006,6 +4323,85 @@
               <a:t>60-Sequence Simulation Set</a:t>
             </a:r>
             <a:endParaRPr lang="en-US" sz="1500" dirty="0">
+              <a:latin typeface="Arial"/>
+              <a:cs typeface="Arial"/>
+            </a:endParaRPr>
+          </a:p>
+        </p:txBody>
+      </p:sp>
+      <p:sp>
+        <p:nvSpPr>
+          <p:cNvPr id="7" name="TextBox 6"/>
+          <p:cNvSpPr txBox="1"/>
+          <p:nvPr/>
+        </p:nvSpPr>
+        <p:spPr>
+          <a:xfrm>
+            <a:off x="947757" y="683870"/>
+            <a:ext cx="4024525" cy="307777"/>
+          </a:xfrm>
+          <a:prstGeom prst="rect">
+            <a:avLst/>
+          </a:prstGeom>
+          <a:noFill/>
+        </p:spPr>
+        <p:txBody>
+          <a:bodyPr wrap="square" rtlCol="0">
+            <a:spAutoFit/>
+          </a:bodyPr>
+          <a:lstStyle/>
+          <a:p>
+            <a:r>
+              <a:rPr lang="en-US" sz="1400" b="1" dirty="0" smtClean="0">
+                <a:latin typeface="Arial"/>
+                <a:cs typeface="Arial"/>
+              </a:rPr>
+              <a:t>A                                                                        B</a:t>
+            </a:r>
+            <a:endParaRPr lang="en-US" sz="1400" b="1" dirty="0">
+              <a:latin typeface="Arial"/>
+              <a:cs typeface="Arial"/>
+            </a:endParaRPr>
+          </a:p>
+        </p:txBody>
+      </p:sp>
+      <p:sp>
+        <p:nvSpPr>
+          <p:cNvPr id="9" name="TextBox 8"/>
+          <p:cNvSpPr txBox="1"/>
+          <p:nvPr/>
+        </p:nvSpPr>
+        <p:spPr>
+          <a:xfrm>
+            <a:off x="947757" y="3876579"/>
+            <a:ext cx="4024525" cy="307777"/>
+          </a:xfrm>
+          <a:prstGeom prst="rect">
+            <a:avLst/>
+          </a:prstGeom>
+          <a:noFill/>
+        </p:spPr>
+        <p:txBody>
+          <a:bodyPr wrap="square" rtlCol="0">
+            <a:spAutoFit/>
+          </a:bodyPr>
+          <a:lstStyle/>
+          <a:p>
+            <a:r>
+              <a:rPr lang="en-US" sz="1400" b="1" dirty="0">
+                <a:latin typeface="Arial"/>
+                <a:cs typeface="Arial"/>
+              </a:rPr>
+              <a:t>C</a:t>
+            </a:r>
+            <a:r>
+              <a:rPr lang="en-US" sz="1400" b="1" dirty="0" smtClean="0">
+                <a:latin typeface="Arial"/>
+                <a:cs typeface="Arial"/>
+              </a:rPr>
+              <a:t>                                                                        D</a:t>
+            </a:r>
+            <a:endParaRPr lang="en-US" sz="1400" b="1" dirty="0">
               <a:latin typeface="Arial"/>
               <a:cs typeface="Arial"/>
             </a:endParaRPr>
@@ -4051,7 +4447,7 @@
           <p:nvPr/>
         </p:nvPicPr>
         <p:blipFill rotWithShape="1">
-          <a:blip r:embed="rId2">
+          <a:blip r:embed="rId3">
             <a:extLst>
               <a:ext uri="{28A0092B-C50C-407E-A947-70E740481C1C}">
                 <a14:useLocalDpi xmlns:a14="http://schemas.microsoft.com/office/drawing/2010/main" val="0"/>
@@ -4073,13 +4469,13 @@
       </p:pic>
       <p:sp>
         <p:nvSpPr>
-          <p:cNvPr id="5" name="TextBox 4"/>
+          <p:cNvPr id="7" name="TextBox 6"/>
           <p:cNvSpPr txBox="1"/>
           <p:nvPr/>
         </p:nvSpPr>
         <p:spPr>
           <a:xfrm>
-            <a:off x="2520945" y="2029750"/>
+            <a:off x="2337934" y="2183638"/>
             <a:ext cx="674078" cy="307777"/>
           </a:xfrm>
           <a:prstGeom prst="rect">
@@ -4109,13 +4505,13 @@
       </p:sp>
       <p:sp>
         <p:nvSpPr>
-          <p:cNvPr id="6" name="TextBox 5"/>
+          <p:cNvPr id="8" name="TextBox 7"/>
           <p:cNvSpPr txBox="1"/>
           <p:nvPr/>
         </p:nvSpPr>
         <p:spPr>
           <a:xfrm>
-            <a:off x="6242481" y="2029750"/>
+            <a:off x="6170218" y="2182822"/>
             <a:ext cx="629140" cy="307777"/>
           </a:xfrm>
           <a:prstGeom prst="rect">
@@ -4137,6 +4533,42 @@
               <a:t>Paml</a:t>
             </a:r>
             <a:endParaRPr lang="en-US" sz="1400" dirty="0">
+              <a:latin typeface="Arial"/>
+              <a:cs typeface="Arial"/>
+            </a:endParaRPr>
+          </a:p>
+        </p:txBody>
+      </p:sp>
+      <p:sp>
+        <p:nvSpPr>
+          <p:cNvPr id="9" name="TextBox 8"/>
+          <p:cNvSpPr txBox="1"/>
+          <p:nvPr/>
+        </p:nvSpPr>
+        <p:spPr>
+          <a:xfrm>
+            <a:off x="859460" y="2125783"/>
+            <a:ext cx="4950617" cy="307777"/>
+          </a:xfrm>
+          <a:prstGeom prst="rect">
+            <a:avLst/>
+          </a:prstGeom>
+          <a:noFill/>
+        </p:spPr>
+        <p:txBody>
+          <a:bodyPr wrap="square" rtlCol="0">
+            <a:spAutoFit/>
+          </a:bodyPr>
+          <a:lstStyle/>
+          <a:p>
+            <a:r>
+              <a:rPr lang="en-US" sz="1400" b="1" dirty="0" smtClean="0">
+                <a:latin typeface="Arial"/>
+                <a:cs typeface="Arial"/>
+              </a:rPr>
+              <a:t>A						                     B		</a:t>
+            </a:r>
+            <a:endParaRPr lang="en-US" sz="1400" b="1" dirty="0">
               <a:latin typeface="Arial"/>
               <a:cs typeface="Arial"/>
             </a:endParaRPr>

</xml_diff>

<commit_message>
Edited figures for proper labeling (cap letters)
</commit_message>
<xml_diff>
--- a/analysis/Rcode_plots/edit_figures.pptx
+++ b/analysis/Rcode_plots/edit_figures.pptx
@@ -195,7 +195,7 @@
           <a:p>
             <a:fld id="{B68487BB-9814-3442-A4D2-A497D91B2A40}" type="datetimeFigureOut">
               <a:rPr lang="en-US" smtClean="0"/>
-              <a:t>1/19/14</a:t>
+              <a:t>1/22/14</a:t>
             </a:fld>
             <a:endParaRPr lang="en-US"/>
           </a:p>
@@ -509,18 +509,38 @@
           <a:p>
             <a:r>
               <a:rPr lang="en-US" dirty="0" smtClean="0"/>
-              <a:t>1/18. Removed R’s main and added own</a:t>
-            </a:r>
+              <a:t>1/18. Removed R’s main and added own.</a:t>
+            </a:r>
+          </a:p>
+          <a:p>
             <a:r>
               <a:rPr lang="en-US" dirty="0" smtClean="0"/>
-              <a:t>.</a:t>
-            </a:r>
-          </a:p>
-          <a:p>
+              <a:t>1/19. Added </a:t>
+            </a:r>
             <a:r>
               <a:rPr lang="en-US" dirty="0" smtClean="0"/>
-              <a:t>1/19. Added ABC</a:t>
-            </a:r>
+              <a:t>ABC</a:t>
+            </a:r>
+          </a:p>
+          <a:p>
+            <a:r>
+              <a:rPr lang="en-US" dirty="0" smtClean="0"/>
+              <a:t>1/22/19.</a:t>
+            </a:r>
+            <a:r>
+              <a:rPr lang="en-US" baseline="0" dirty="0" smtClean="0"/>
+              <a:t> Changed Fubar-&gt;FUBAR, </a:t>
+            </a:r>
+            <a:r>
+              <a:rPr lang="en-US" baseline="0" dirty="0" err="1" smtClean="0"/>
+              <a:t>Paml</a:t>
+            </a:r>
+            <a:r>
+              <a:rPr lang="en-US" baseline="0" dirty="0" smtClean="0"/>
+              <a:t>-&gt;PAML. Remade the raw figure with R so that legend has all caps for FUBAR and PAML</a:t>
+            </a:r>
+          </a:p>
+          <a:p>
             <a:endParaRPr lang="en-US" dirty="0"/>
           </a:p>
         </p:txBody>
@@ -624,11 +644,7 @@
             </a:pPr>
             <a:r>
               <a:rPr lang="en-US" dirty="0" smtClean="0"/>
-              <a:t>1/18. Removed R’s main and added own</a:t>
-            </a:r>
-            <a:r>
-              <a:rPr lang="en-US" dirty="0" smtClean="0"/>
-              <a:t>.</a:t>
+              <a:t>1/18. Removed R’s main and added own.</a:t>
             </a:r>
           </a:p>
           <a:p>
@@ -653,7 +669,6 @@
               <a:rPr lang="en-US" dirty="0" smtClean="0"/>
               <a:t>1/19. Added AB</a:t>
             </a:r>
-            <a:endParaRPr lang="en-US" dirty="0" smtClean="0"/>
           </a:p>
           <a:p>
             <a:endParaRPr lang="en-US" dirty="0"/>
@@ -752,8 +767,50 @@
           <a:p>
             <a:r>
               <a:rPr lang="en-US" baseline="0" dirty="0" smtClean="0"/>
-              <a:t>1/19. Added ABCD</a:t>
-            </a:r>
+              <a:t>1/19. Added </a:t>
+            </a:r>
+            <a:r>
+              <a:rPr lang="en-US" baseline="0" dirty="0" smtClean="0"/>
+              <a:t>ABCD</a:t>
+            </a:r>
+          </a:p>
+          <a:p>
+            <a:pPr marL="0" marR="0" indent="0" algn="l" defTabSz="457200" rtl="0" eaLnBrk="1" fontAlgn="auto" latinLnBrk="0" hangingPunct="1">
+              <a:lnSpc>
+                <a:spcPct val="100000"/>
+              </a:lnSpc>
+              <a:spcBef>
+                <a:spcPts val="0"/>
+              </a:spcBef>
+              <a:spcAft>
+                <a:spcPts val="0"/>
+              </a:spcAft>
+              <a:buClrTx/>
+              <a:buSzTx/>
+              <a:buFontTx/>
+              <a:buNone/>
+              <a:tabLst/>
+              <a:defRPr/>
+            </a:pPr>
+            <a:r>
+              <a:rPr lang="en-US" dirty="0" smtClean="0"/>
+              <a:t>1/22/19.</a:t>
+            </a:r>
+            <a:r>
+              <a:rPr lang="en-US" baseline="0" dirty="0" smtClean="0"/>
+              <a:t> Changed Fubar-&gt;FUBAR, </a:t>
+            </a:r>
+            <a:r>
+              <a:rPr lang="en-US" baseline="0" dirty="0" err="1" smtClean="0"/>
+              <a:t>Paml</a:t>
+            </a:r>
+            <a:r>
+              <a:rPr lang="en-US" baseline="0" dirty="0" smtClean="0"/>
+              <a:t>-&gt;PAML. Remade the raw figure with R so that legend has all caps for FUBAR and PAML</a:t>
+            </a:r>
+          </a:p>
+          <a:p>
+            <a:endParaRPr lang="en-US" baseline="0" dirty="0" smtClean="0"/>
           </a:p>
         </p:txBody>
       </p:sp>
@@ -857,13 +914,51 @@
           <a:p>
             <a:r>
               <a:rPr lang="en-US" baseline="0" dirty="0" smtClean="0"/>
-              <a:t>1/19. </a:t>
-            </a:r>
-            <a:r>
-              <a:rPr lang="en-US" baseline="0" smtClean="0"/>
-              <a:t>Added AB</a:t>
-            </a:r>
-            <a:endParaRPr lang="en-US"/>
+              <a:t>1/19. Added </a:t>
+            </a:r>
+            <a:r>
+              <a:rPr lang="en-US" baseline="0" dirty="0" smtClean="0"/>
+              <a:t>AB</a:t>
+            </a:r>
+          </a:p>
+          <a:p>
+            <a:pPr marL="0" marR="0" indent="0" algn="l" defTabSz="457200" rtl="0" eaLnBrk="1" fontAlgn="auto" latinLnBrk="0" hangingPunct="1">
+              <a:lnSpc>
+                <a:spcPct val="100000"/>
+              </a:lnSpc>
+              <a:spcBef>
+                <a:spcPts val="0"/>
+              </a:spcBef>
+              <a:spcAft>
+                <a:spcPts val="0"/>
+              </a:spcAft>
+              <a:buClrTx/>
+              <a:buSzTx/>
+              <a:buFontTx/>
+              <a:buNone/>
+              <a:tabLst/>
+              <a:defRPr/>
+            </a:pPr>
+            <a:r>
+              <a:rPr lang="en-US" dirty="0" smtClean="0"/>
+              <a:t>1/22/19.</a:t>
+            </a:r>
+            <a:r>
+              <a:rPr lang="en-US" baseline="0" dirty="0" smtClean="0"/>
+              <a:t> Changed Fubar-&gt;FUBAR, </a:t>
+            </a:r>
+            <a:r>
+              <a:rPr lang="en-US" baseline="0" dirty="0" err="1" smtClean="0"/>
+              <a:t>Paml</a:t>
+            </a:r>
+            <a:r>
+              <a:rPr lang="en-US" baseline="0" dirty="0" smtClean="0"/>
+              <a:t>-&gt;PAML</a:t>
+            </a:r>
+            <a:endParaRPr lang="en-US" dirty="0" smtClean="0"/>
+          </a:p>
+          <a:p>
+            <a:endParaRPr lang="en-US" dirty="0"/>
           </a:p>
         </p:txBody>
       </p:sp>
@@ -1084,7 +1179,7 @@
           <a:p>
             <a:fld id="{12FAC503-EA1F-3E4C-84BC-5AA3D60989DE}" type="datetimeFigureOut">
               <a:rPr lang="en-US" smtClean="0"/>
-              <a:t>1/19/14</a:t>
+              <a:t>1/22/14</a:t>
             </a:fld>
             <a:endParaRPr lang="en-US"/>
           </a:p>
@@ -1254,7 +1349,7 @@
           <a:p>
             <a:fld id="{12FAC503-EA1F-3E4C-84BC-5AA3D60989DE}" type="datetimeFigureOut">
               <a:rPr lang="en-US" smtClean="0"/>
-              <a:t>1/19/14</a:t>
+              <a:t>1/22/14</a:t>
             </a:fld>
             <a:endParaRPr lang="en-US"/>
           </a:p>
@@ -1434,7 +1529,7 @@
           <a:p>
             <a:fld id="{12FAC503-EA1F-3E4C-84BC-5AA3D60989DE}" type="datetimeFigureOut">
               <a:rPr lang="en-US" smtClean="0"/>
-              <a:t>1/19/14</a:t>
+              <a:t>1/22/14</a:t>
             </a:fld>
             <a:endParaRPr lang="en-US"/>
           </a:p>
@@ -1604,7 +1699,7 @@
           <a:p>
             <a:fld id="{12FAC503-EA1F-3E4C-84BC-5AA3D60989DE}" type="datetimeFigureOut">
               <a:rPr lang="en-US" smtClean="0"/>
-              <a:t>1/19/14</a:t>
+              <a:t>1/22/14</a:t>
             </a:fld>
             <a:endParaRPr lang="en-US"/>
           </a:p>
@@ -1850,7 +1945,7 @@
           <a:p>
             <a:fld id="{12FAC503-EA1F-3E4C-84BC-5AA3D60989DE}" type="datetimeFigureOut">
               <a:rPr lang="en-US" smtClean="0"/>
-              <a:t>1/19/14</a:t>
+              <a:t>1/22/14</a:t>
             </a:fld>
             <a:endParaRPr lang="en-US"/>
           </a:p>
@@ -2138,7 +2233,7 @@
           <a:p>
             <a:fld id="{12FAC503-EA1F-3E4C-84BC-5AA3D60989DE}" type="datetimeFigureOut">
               <a:rPr lang="en-US" smtClean="0"/>
-              <a:t>1/19/14</a:t>
+              <a:t>1/22/14</a:t>
             </a:fld>
             <a:endParaRPr lang="en-US"/>
           </a:p>
@@ -2560,7 +2655,7 @@
           <a:p>
             <a:fld id="{12FAC503-EA1F-3E4C-84BC-5AA3D60989DE}" type="datetimeFigureOut">
               <a:rPr lang="en-US" smtClean="0"/>
-              <a:t>1/19/14</a:t>
+              <a:t>1/22/14</a:t>
             </a:fld>
             <a:endParaRPr lang="en-US"/>
           </a:p>
@@ -2678,7 +2773,7 @@
           <a:p>
             <a:fld id="{12FAC503-EA1F-3E4C-84BC-5AA3D60989DE}" type="datetimeFigureOut">
               <a:rPr lang="en-US" smtClean="0"/>
-              <a:t>1/19/14</a:t>
+              <a:t>1/22/14</a:t>
             </a:fld>
             <a:endParaRPr lang="en-US"/>
           </a:p>
@@ -2773,7 +2868,7 @@
           <a:p>
             <a:fld id="{12FAC503-EA1F-3E4C-84BC-5AA3D60989DE}" type="datetimeFigureOut">
               <a:rPr lang="en-US" smtClean="0"/>
-              <a:t>1/19/14</a:t>
+              <a:t>1/22/14</a:t>
             </a:fld>
             <a:endParaRPr lang="en-US"/>
           </a:p>
@@ -3050,7 +3145,7 @@
           <a:p>
             <a:fld id="{12FAC503-EA1F-3E4C-84BC-5AA3D60989DE}" type="datetimeFigureOut">
               <a:rPr lang="en-US" smtClean="0"/>
-              <a:t>1/19/14</a:t>
+              <a:t>1/22/14</a:t>
             </a:fld>
             <a:endParaRPr lang="en-US"/>
           </a:p>
@@ -3303,7 +3398,7 @@
           <a:p>
             <a:fld id="{12FAC503-EA1F-3E4C-84BC-5AA3D60989DE}" type="datetimeFigureOut">
               <a:rPr lang="en-US" smtClean="0"/>
-              <a:t>1/19/14</a:t>
+              <a:t>1/22/14</a:t>
             </a:fld>
             <a:endParaRPr lang="en-US"/>
           </a:p>
@@ -3516,7 +3611,7 @@
           <a:p>
             <a:fld id="{12FAC503-EA1F-3E4C-84BC-5AA3D60989DE}" type="datetimeFigureOut">
               <a:rPr lang="en-US" smtClean="0"/>
-              <a:t>1/19/14</a:t>
+              <a:t>1/22/14</a:t>
             </a:fld>
             <a:endParaRPr lang="en-US"/>
           </a:p>
@@ -3893,13 +3988,13 @@
       </p:grpSpPr>
       <p:pic>
         <p:nvPicPr>
-          <p:cNvPr id="4" name="Picture 3" descr="roc.pdf"/>
+          <p:cNvPr id="8" name="Picture 7" descr="roc_raw.pdf"/>
           <p:cNvPicPr>
             <a:picLocks noChangeAspect="1"/>
           </p:cNvPicPr>
           <p:nvPr/>
         </p:nvPicPr>
-        <p:blipFill rotWithShape="1">
+        <p:blipFill>
           <a:blip r:embed="rId3">
             <a:extLst>
               <a:ext uri="{28A0092B-C50C-407E-A947-70E740481C1C}">
@@ -3907,13 +4002,14 @@
               </a:ext>
             </a:extLst>
           </a:blip>
-          <a:srcRect t="16532"/>
-          <a:stretch/>
+          <a:stretch>
+            <a:fillRect/>
+          </a:stretch>
         </p:blipFill>
         <p:spPr>
           <a:xfrm>
-            <a:off x="231630" y="2159000"/>
-            <a:ext cx="8466862" cy="2650182"/>
+            <a:off x="549278" y="1656860"/>
+            <a:ext cx="7695549" cy="2885831"/>
           </a:xfrm>
           <a:prstGeom prst="rect">
             <a:avLst/>
@@ -3922,85 +4018,13 @@
       </p:pic>
       <p:sp>
         <p:nvSpPr>
-          <p:cNvPr id="5" name="TextBox 4"/>
-          <p:cNvSpPr txBox="1"/>
-          <p:nvPr/>
-        </p:nvSpPr>
-        <p:spPr>
-          <a:xfrm>
-            <a:off x="4336083" y="2037445"/>
-            <a:ext cx="674078" cy="292388"/>
-          </a:xfrm>
-          <a:prstGeom prst="rect">
-            <a:avLst/>
-          </a:prstGeom>
-          <a:noFill/>
-        </p:spPr>
-        <p:txBody>
-          <a:bodyPr wrap="square" rtlCol="0">
-            <a:spAutoFit/>
-          </a:bodyPr>
-          <a:lstStyle/>
-          <a:p>
-            <a:r>
-              <a:rPr lang="en-US" sz="1300" dirty="0" smtClean="0">
-                <a:latin typeface="Arial"/>
-                <a:cs typeface="Arial"/>
-              </a:rPr>
-              <a:t>Fubar</a:t>
-            </a:r>
-            <a:endParaRPr lang="en-US" sz="1300" dirty="0">
-              <a:latin typeface="Arial"/>
-              <a:cs typeface="Arial"/>
-            </a:endParaRPr>
-          </a:p>
-        </p:txBody>
-      </p:sp>
-      <p:sp>
-        <p:nvSpPr>
-          <p:cNvPr id="6" name="TextBox 5"/>
-          <p:cNvSpPr txBox="1"/>
-          <p:nvPr/>
-        </p:nvSpPr>
-        <p:spPr>
-          <a:xfrm>
-            <a:off x="7156937" y="2037445"/>
-            <a:ext cx="629140" cy="292388"/>
-          </a:xfrm>
-          <a:prstGeom prst="rect">
-            <a:avLst/>
-          </a:prstGeom>
-          <a:noFill/>
-        </p:spPr>
-        <p:txBody>
-          <a:bodyPr wrap="square" rtlCol="0">
-            <a:spAutoFit/>
-          </a:bodyPr>
-          <a:lstStyle/>
-          <a:p>
-            <a:r>
-              <a:rPr lang="en-US" sz="1300" dirty="0" err="1" smtClean="0">
-                <a:latin typeface="Arial"/>
-                <a:cs typeface="Arial"/>
-              </a:rPr>
-              <a:t>Paml</a:t>
-            </a:r>
-            <a:endParaRPr lang="en-US" sz="1300" dirty="0">
-              <a:latin typeface="Arial"/>
-              <a:cs typeface="Arial"/>
-            </a:endParaRPr>
-          </a:p>
-        </p:txBody>
-      </p:sp>
-      <p:sp>
-        <p:nvSpPr>
           <p:cNvPr id="2" name="TextBox 1"/>
           <p:cNvSpPr txBox="1"/>
           <p:nvPr/>
         </p:nvSpPr>
         <p:spPr>
           <a:xfrm>
-            <a:off x="305048" y="1891251"/>
+            <a:off x="549278" y="1985066"/>
             <a:ext cx="8308141" cy="292388"/>
           </a:xfrm>
           <a:prstGeom prst="rect">
@@ -4019,9 +4043,123 @@
                 <a:latin typeface="Arial"/>
                 <a:cs typeface="Arial"/>
               </a:rPr>
-              <a:t>A						  B						    C</a:t>
+              <a:t>A				</a:t>
+            </a:r>
+            <a:r>
+              <a:rPr lang="en-US" sz="1300" b="1" dirty="0">
+                <a:latin typeface="Arial"/>
+                <a:cs typeface="Arial"/>
+              </a:rPr>
+              <a:t> </a:t>
+            </a:r>
+            <a:r>
+              <a:rPr lang="en-US" sz="1300" b="1" dirty="0" smtClean="0">
+                <a:latin typeface="Arial"/>
+                <a:cs typeface="Arial"/>
+              </a:rPr>
+              <a:t>             </a:t>
+            </a:r>
+            <a:r>
+              <a:rPr lang="en-US" sz="1300" b="1" dirty="0" smtClean="0">
+                <a:latin typeface="Arial"/>
+                <a:cs typeface="Arial"/>
+              </a:rPr>
+              <a:t>  </a:t>
+            </a:r>
+            <a:r>
+              <a:rPr lang="en-US" sz="1300" b="1" dirty="0" smtClean="0">
+                <a:latin typeface="Arial"/>
+                <a:cs typeface="Arial"/>
+              </a:rPr>
+              <a:t>B						 </a:t>
+            </a:r>
+            <a:r>
+              <a:rPr lang="en-US" sz="1300" b="1" dirty="0" smtClean="0">
+                <a:latin typeface="Arial"/>
+                <a:cs typeface="Arial"/>
+              </a:rPr>
+              <a:t> </a:t>
+            </a:r>
+            <a:r>
+              <a:rPr lang="en-US" sz="1300" b="1" dirty="0" smtClean="0">
+                <a:latin typeface="Arial"/>
+                <a:cs typeface="Arial"/>
+              </a:rPr>
+              <a:t>C</a:t>
             </a:r>
             <a:endParaRPr lang="en-US" sz="1300" b="1" dirty="0">
+              <a:latin typeface="Arial"/>
+              <a:cs typeface="Arial"/>
+            </a:endParaRPr>
+          </a:p>
+        </p:txBody>
+      </p:sp>
+      <p:sp>
+        <p:nvSpPr>
+          <p:cNvPr id="5" name="TextBox 4"/>
+          <p:cNvSpPr txBox="1"/>
+          <p:nvPr/>
+        </p:nvSpPr>
+        <p:spPr>
+          <a:xfrm>
+            <a:off x="4210151" y="2031801"/>
+            <a:ext cx="700988" cy="276999"/>
+          </a:xfrm>
+          <a:prstGeom prst="rect">
+            <a:avLst/>
+          </a:prstGeom>
+          <a:noFill/>
+        </p:spPr>
+        <p:txBody>
+          <a:bodyPr wrap="square" rtlCol="0">
+            <a:spAutoFit/>
+          </a:bodyPr>
+          <a:lstStyle/>
+          <a:p>
+            <a:r>
+              <a:rPr lang="en-US" sz="1200" dirty="0" smtClean="0">
+                <a:latin typeface="Arial"/>
+                <a:cs typeface="Arial"/>
+              </a:rPr>
+              <a:t>FUBAR</a:t>
+            </a:r>
+            <a:endParaRPr lang="en-US" sz="1200" dirty="0">
+              <a:latin typeface="Arial"/>
+              <a:cs typeface="Arial"/>
+            </a:endParaRPr>
+          </a:p>
+        </p:txBody>
+      </p:sp>
+      <p:sp>
+        <p:nvSpPr>
+          <p:cNvPr id="6" name="TextBox 5"/>
+          <p:cNvSpPr txBox="1"/>
+          <p:nvPr/>
+        </p:nvSpPr>
+        <p:spPr>
+          <a:xfrm>
+            <a:off x="6842367" y="2031801"/>
+            <a:ext cx="617592" cy="276999"/>
+          </a:xfrm>
+          <a:prstGeom prst="rect">
+            <a:avLst/>
+          </a:prstGeom>
+          <a:noFill/>
+        </p:spPr>
+        <p:txBody>
+          <a:bodyPr wrap="square" rtlCol="0">
+            <a:spAutoFit/>
+          </a:bodyPr>
+          <a:lstStyle/>
+          <a:p>
+            <a:r>
+              <a:rPr lang="en-US" sz="1200" dirty="0" smtClean="0">
+                <a:latin typeface="Arial"/>
+                <a:cs typeface="Arial"/>
+              </a:rPr>
+              <a:t>PAML</a:t>
+            </a:r>
+            <a:endParaRPr lang="en-US" sz="1200" dirty="0">
               <a:latin typeface="Arial"/>
               <a:cs typeface="Arial"/>
             </a:endParaRPr>
@@ -4089,78 +4227,6 @@
       </p:pic>
       <p:sp>
         <p:nvSpPr>
-          <p:cNvPr id="5" name="TextBox 4"/>
-          <p:cNvSpPr txBox="1"/>
-          <p:nvPr/>
-        </p:nvSpPr>
-        <p:spPr>
-          <a:xfrm>
-            <a:off x="2337934" y="2183638"/>
-            <a:ext cx="674078" cy="307777"/>
-          </a:xfrm>
-          <a:prstGeom prst="rect">
-            <a:avLst/>
-          </a:prstGeom>
-          <a:noFill/>
-        </p:spPr>
-        <p:txBody>
-          <a:bodyPr wrap="square" rtlCol="0">
-            <a:spAutoFit/>
-          </a:bodyPr>
-          <a:lstStyle/>
-          <a:p>
-            <a:r>
-              <a:rPr lang="en-US" sz="1400" dirty="0" smtClean="0">
-                <a:latin typeface="Arial"/>
-                <a:cs typeface="Arial"/>
-              </a:rPr>
-              <a:t>Fubar</a:t>
-            </a:r>
-            <a:endParaRPr lang="en-US" sz="1400" dirty="0">
-              <a:latin typeface="Arial"/>
-              <a:cs typeface="Arial"/>
-            </a:endParaRPr>
-          </a:p>
-        </p:txBody>
-      </p:sp>
-      <p:sp>
-        <p:nvSpPr>
-          <p:cNvPr id="6" name="TextBox 5"/>
-          <p:cNvSpPr txBox="1"/>
-          <p:nvPr/>
-        </p:nvSpPr>
-        <p:spPr>
-          <a:xfrm>
-            <a:off x="6170218" y="2182822"/>
-            <a:ext cx="629140" cy="307777"/>
-          </a:xfrm>
-          <a:prstGeom prst="rect">
-            <a:avLst/>
-          </a:prstGeom>
-          <a:noFill/>
-        </p:spPr>
-        <p:txBody>
-          <a:bodyPr wrap="square" rtlCol="0">
-            <a:spAutoFit/>
-          </a:bodyPr>
-          <a:lstStyle/>
-          <a:p>
-            <a:r>
-              <a:rPr lang="en-US" sz="1400" dirty="0" err="1" smtClean="0">
-                <a:latin typeface="Arial"/>
-                <a:cs typeface="Arial"/>
-              </a:rPr>
-              <a:t>Paml</a:t>
-            </a:r>
-            <a:endParaRPr lang="en-US" sz="1400" dirty="0">
-              <a:latin typeface="Arial"/>
-              <a:cs typeface="Arial"/>
-            </a:endParaRPr>
-          </a:p>
-        </p:txBody>
-      </p:sp>
-      <p:sp>
-        <p:nvSpPr>
           <p:cNvPr id="7" name="TextBox 6"/>
           <p:cNvSpPr txBox="1"/>
           <p:nvPr/>
@@ -4189,6 +4255,78 @@
               <a:t>A						                     B		</a:t>
             </a:r>
             <a:endParaRPr lang="en-US" sz="1400" b="1" dirty="0">
+              <a:latin typeface="Arial"/>
+              <a:cs typeface="Arial"/>
+            </a:endParaRPr>
+          </a:p>
+        </p:txBody>
+      </p:sp>
+      <p:sp>
+        <p:nvSpPr>
+          <p:cNvPr id="5" name="TextBox 4"/>
+          <p:cNvSpPr txBox="1"/>
+          <p:nvPr/>
+        </p:nvSpPr>
+        <p:spPr>
+          <a:xfrm>
+            <a:off x="2337934" y="2183638"/>
+            <a:ext cx="783254" cy="307777"/>
+          </a:xfrm>
+          <a:prstGeom prst="rect">
+            <a:avLst/>
+          </a:prstGeom>
+          <a:noFill/>
+        </p:spPr>
+        <p:txBody>
+          <a:bodyPr wrap="square" rtlCol="0">
+            <a:spAutoFit/>
+          </a:bodyPr>
+          <a:lstStyle/>
+          <a:p>
+            <a:r>
+              <a:rPr lang="en-US" sz="1400" dirty="0" smtClean="0">
+                <a:latin typeface="Arial"/>
+                <a:cs typeface="Arial"/>
+              </a:rPr>
+              <a:t>FUBAR</a:t>
+            </a:r>
+            <a:endParaRPr lang="en-US" sz="1400" dirty="0">
+              <a:latin typeface="Arial"/>
+              <a:cs typeface="Arial"/>
+            </a:endParaRPr>
+          </a:p>
+        </p:txBody>
+      </p:sp>
+      <p:sp>
+        <p:nvSpPr>
+          <p:cNvPr id="6" name="TextBox 5"/>
+          <p:cNvSpPr txBox="1"/>
+          <p:nvPr/>
+        </p:nvSpPr>
+        <p:spPr>
+          <a:xfrm>
+            <a:off x="6174819" y="2182822"/>
+            <a:ext cx="653460" cy="307777"/>
+          </a:xfrm>
+          <a:prstGeom prst="rect">
+            <a:avLst/>
+          </a:prstGeom>
+          <a:noFill/>
+        </p:spPr>
+        <p:txBody>
+          <a:bodyPr wrap="square" rtlCol="0">
+            <a:spAutoFit/>
+          </a:bodyPr>
+          <a:lstStyle/>
+          <a:p>
+            <a:r>
+              <a:rPr lang="en-US" sz="1400" dirty="0" smtClean="0">
+                <a:latin typeface="Arial"/>
+                <a:cs typeface="Arial"/>
+              </a:rPr>
+              <a:t>PAML</a:t>
+            </a:r>
+            <a:endParaRPr lang="en-US" sz="1400" dirty="0">
               <a:latin typeface="Arial"/>
               <a:cs typeface="Arial"/>
             </a:endParaRPr>
@@ -4225,9 +4363,88 @@
           <a:chExt cx="0" cy="0"/>
         </a:xfrm>
       </p:grpSpPr>
+      <p:sp>
+        <p:nvSpPr>
+          <p:cNvPr id="7" name="TextBox 6"/>
+          <p:cNvSpPr txBox="1"/>
+          <p:nvPr/>
+        </p:nvSpPr>
+        <p:spPr>
+          <a:xfrm>
+            <a:off x="947757" y="683870"/>
+            <a:ext cx="4024525" cy="307777"/>
+          </a:xfrm>
+          <a:prstGeom prst="rect">
+            <a:avLst/>
+          </a:prstGeom>
+          <a:noFill/>
+        </p:spPr>
+        <p:txBody>
+          <a:bodyPr wrap="square" rtlCol="0">
+            <a:spAutoFit/>
+          </a:bodyPr>
+          <a:lstStyle/>
+          <a:p>
+            <a:r>
+              <a:rPr lang="en-US" sz="1400" b="1" dirty="0" smtClean="0">
+                <a:latin typeface="Arial"/>
+                <a:cs typeface="Arial"/>
+              </a:rPr>
+              <a:t>A                                                                        B</a:t>
+            </a:r>
+            <a:endParaRPr lang="en-US" sz="1400" b="1" dirty="0">
+              <a:latin typeface="Arial"/>
+              <a:cs typeface="Arial"/>
+            </a:endParaRPr>
+          </a:p>
+        </p:txBody>
+      </p:sp>
+      <p:sp>
+        <p:nvSpPr>
+          <p:cNvPr id="9" name="TextBox 8"/>
+          <p:cNvSpPr txBox="1"/>
+          <p:nvPr/>
+        </p:nvSpPr>
+        <p:spPr>
+          <a:xfrm>
+            <a:off x="947757" y="3876579"/>
+            <a:ext cx="4024525" cy="307777"/>
+          </a:xfrm>
+          <a:prstGeom prst="rect">
+            <a:avLst/>
+          </a:prstGeom>
+          <a:noFill/>
+        </p:spPr>
+        <p:txBody>
+          <a:bodyPr wrap="square" rtlCol="0">
+            <a:spAutoFit/>
+          </a:bodyPr>
+          <a:lstStyle/>
+          <a:p>
+            <a:r>
+              <a:rPr lang="en-US" sz="1400" b="1" dirty="0">
+                <a:latin typeface="Arial"/>
+                <a:cs typeface="Arial"/>
+              </a:rPr>
+              <a:t>C</a:t>
+            </a:r>
+            <a:r>
+              <a:rPr lang="en-US" sz="1400" b="1" dirty="0" smtClean="0">
+                <a:latin typeface="Arial"/>
+                <a:cs typeface="Arial"/>
+              </a:rPr>
+              <a:t>                                                                        D</a:t>
+            </a:r>
+            <a:endParaRPr lang="en-US" sz="1400" b="1" dirty="0">
+              <a:latin typeface="Arial"/>
+              <a:cs typeface="Arial"/>
+            </a:endParaRPr>
+          </a:p>
+        </p:txBody>
+      </p:sp>
       <p:pic>
         <p:nvPicPr>
-          <p:cNvPr id="4" name="Picture 3" descr="tprfpr.pdf"/>
+          <p:cNvPr id="2" name="Picture 1" descr="tprfpr_raw.pdf"/>
           <p:cNvPicPr>
             <a:picLocks noChangeAspect="1"/>
           </p:cNvPicPr>
@@ -4264,7 +4481,7 @@
         <p:spPr>
           <a:xfrm>
             <a:off x="3185911" y="361048"/>
-            <a:ext cx="2624166" cy="323165"/>
+            <a:ext cx="2624166" cy="315471"/>
           </a:xfrm>
           <a:prstGeom prst="rect">
             <a:avLst/>
@@ -4277,15 +4494,15 @@
           </a:bodyPr>
           <a:lstStyle/>
           <a:p>
-            <a:pPr algn="dist"/>
-            <a:r>
-              <a:rPr lang="en-US" sz="1500" dirty="0" smtClean="0">
+            <a:pPr algn="ctr"/>
+            <a:r>
+              <a:rPr lang="en-US" sz="1450" dirty="0" smtClean="0">
                 <a:latin typeface="Arial"/>
                 <a:cs typeface="Arial"/>
               </a:rPr>
               <a:t>26-Sequence Simulation Set</a:t>
             </a:r>
-            <a:endParaRPr lang="en-US" sz="1500" dirty="0">
+            <a:endParaRPr lang="en-US" sz="1450" dirty="0">
               <a:latin typeface="Arial"/>
               <a:cs typeface="Arial"/>
             </a:endParaRPr>
@@ -4316,92 +4533,13 @@
           <a:p>
             <a:pPr algn="ctr"/>
             <a:r>
-              <a:rPr lang="en-US" sz="1500" dirty="0" smtClean="0">
+              <a:rPr lang="en-US" sz="1450" dirty="0" smtClean="0">
                 <a:latin typeface="Arial"/>
                 <a:cs typeface="Arial"/>
               </a:rPr>
               <a:t>60-Sequence Simulation Set</a:t>
             </a:r>
-            <a:endParaRPr lang="en-US" sz="1500" dirty="0">
-              <a:latin typeface="Arial"/>
-              <a:cs typeface="Arial"/>
-            </a:endParaRPr>
-          </a:p>
-        </p:txBody>
-      </p:sp>
-      <p:sp>
-        <p:nvSpPr>
-          <p:cNvPr id="7" name="TextBox 6"/>
-          <p:cNvSpPr txBox="1"/>
-          <p:nvPr/>
-        </p:nvSpPr>
-        <p:spPr>
-          <a:xfrm>
-            <a:off x="947757" y="683870"/>
-            <a:ext cx="4024525" cy="307777"/>
-          </a:xfrm>
-          <a:prstGeom prst="rect">
-            <a:avLst/>
-          </a:prstGeom>
-          <a:noFill/>
-        </p:spPr>
-        <p:txBody>
-          <a:bodyPr wrap="square" rtlCol="0">
-            <a:spAutoFit/>
-          </a:bodyPr>
-          <a:lstStyle/>
-          <a:p>
-            <a:r>
-              <a:rPr lang="en-US" sz="1400" b="1" dirty="0" smtClean="0">
-                <a:latin typeface="Arial"/>
-                <a:cs typeface="Arial"/>
-              </a:rPr>
-              <a:t>A                                                                        B</a:t>
-            </a:r>
-            <a:endParaRPr lang="en-US" sz="1400" b="1" dirty="0">
-              <a:latin typeface="Arial"/>
-              <a:cs typeface="Arial"/>
-            </a:endParaRPr>
-          </a:p>
-        </p:txBody>
-      </p:sp>
-      <p:sp>
-        <p:nvSpPr>
-          <p:cNvPr id="9" name="TextBox 8"/>
-          <p:cNvSpPr txBox="1"/>
-          <p:nvPr/>
-        </p:nvSpPr>
-        <p:spPr>
-          <a:xfrm>
-            <a:off x="947757" y="3876579"/>
-            <a:ext cx="4024525" cy="307777"/>
-          </a:xfrm>
-          <a:prstGeom prst="rect">
-            <a:avLst/>
-          </a:prstGeom>
-          <a:noFill/>
-        </p:spPr>
-        <p:txBody>
-          <a:bodyPr wrap="square" rtlCol="0">
-            <a:spAutoFit/>
-          </a:bodyPr>
-          <a:lstStyle/>
-          <a:p>
-            <a:r>
-              <a:rPr lang="en-US" sz="1400" b="1" dirty="0">
-                <a:latin typeface="Arial"/>
-                <a:cs typeface="Arial"/>
-              </a:rPr>
-              <a:t>C</a:t>
-            </a:r>
-            <a:r>
-              <a:rPr lang="en-US" sz="1400" b="1" dirty="0" smtClean="0">
-                <a:latin typeface="Arial"/>
-                <a:cs typeface="Arial"/>
-              </a:rPr>
-              <a:t>                                                                        D</a:t>
-            </a:r>
-            <a:endParaRPr lang="en-US" sz="1400" b="1" dirty="0">
+            <a:endParaRPr lang="en-US" sz="1450" dirty="0">
               <a:latin typeface="Arial"/>
               <a:cs typeface="Arial"/>
             </a:endParaRPr>
@@ -4469,85 +4607,13 @@
       </p:pic>
       <p:sp>
         <p:nvSpPr>
-          <p:cNvPr id="7" name="TextBox 6"/>
-          <p:cNvSpPr txBox="1"/>
-          <p:nvPr/>
-        </p:nvSpPr>
-        <p:spPr>
-          <a:xfrm>
-            <a:off x="2337934" y="2183638"/>
-            <a:ext cx="674078" cy="307777"/>
-          </a:xfrm>
-          <a:prstGeom prst="rect">
-            <a:avLst/>
-          </a:prstGeom>
-          <a:noFill/>
-        </p:spPr>
-        <p:txBody>
-          <a:bodyPr wrap="square" rtlCol="0">
-            <a:spAutoFit/>
-          </a:bodyPr>
-          <a:lstStyle/>
-          <a:p>
-            <a:r>
-              <a:rPr lang="en-US" sz="1400" dirty="0" smtClean="0">
-                <a:latin typeface="Arial"/>
-                <a:cs typeface="Arial"/>
-              </a:rPr>
-              <a:t>Fubar</a:t>
-            </a:r>
-            <a:endParaRPr lang="en-US" sz="1400" dirty="0">
-              <a:latin typeface="Arial"/>
-              <a:cs typeface="Arial"/>
-            </a:endParaRPr>
-          </a:p>
-        </p:txBody>
-      </p:sp>
-      <p:sp>
-        <p:nvSpPr>
-          <p:cNvPr id="8" name="TextBox 7"/>
-          <p:cNvSpPr txBox="1"/>
-          <p:nvPr/>
-        </p:nvSpPr>
-        <p:spPr>
-          <a:xfrm>
-            <a:off x="6170218" y="2182822"/>
-            <a:ext cx="629140" cy="307777"/>
-          </a:xfrm>
-          <a:prstGeom prst="rect">
-            <a:avLst/>
-          </a:prstGeom>
-          <a:noFill/>
-        </p:spPr>
-        <p:txBody>
-          <a:bodyPr wrap="square" rtlCol="0">
-            <a:spAutoFit/>
-          </a:bodyPr>
-          <a:lstStyle/>
-          <a:p>
-            <a:r>
-              <a:rPr lang="en-US" sz="1400" dirty="0" err="1" smtClean="0">
-                <a:latin typeface="Arial"/>
-                <a:cs typeface="Arial"/>
-              </a:rPr>
-              <a:t>Paml</a:t>
-            </a:r>
-            <a:endParaRPr lang="en-US" sz="1400" dirty="0">
-              <a:latin typeface="Arial"/>
-              <a:cs typeface="Arial"/>
-            </a:endParaRPr>
-          </a:p>
-        </p:txBody>
-      </p:sp>
-      <p:sp>
-        <p:nvSpPr>
           <p:cNvPr id="9" name="TextBox 8"/>
           <p:cNvSpPr txBox="1"/>
           <p:nvPr/>
         </p:nvSpPr>
         <p:spPr>
           <a:xfrm>
-            <a:off x="859460" y="2125783"/>
+            <a:off x="1025537" y="2125783"/>
             <a:ext cx="4950617" cy="307777"/>
           </a:xfrm>
           <a:prstGeom prst="rect">
@@ -4566,9 +4632,95 @@
                 <a:latin typeface="Arial"/>
                 <a:cs typeface="Arial"/>
               </a:rPr>
-              <a:t>A						                     B		</a:t>
+              <a:t>A						                  </a:t>
+            </a:r>
+            <a:r>
+              <a:rPr lang="en-US" sz="1400" b="1" dirty="0" smtClean="0">
+                <a:latin typeface="Arial"/>
+                <a:cs typeface="Arial"/>
+              </a:rPr>
+              <a:t> </a:t>
+            </a:r>
+            <a:r>
+              <a:rPr lang="en-US" sz="1400" b="1" dirty="0" smtClean="0">
+                <a:latin typeface="Arial"/>
+                <a:cs typeface="Arial"/>
+              </a:rPr>
+              <a:t>B		</a:t>
             </a:r>
             <a:endParaRPr lang="en-US" sz="1400" b="1" dirty="0">
+              <a:latin typeface="Arial"/>
+              <a:cs typeface="Arial"/>
+            </a:endParaRPr>
+          </a:p>
+        </p:txBody>
+      </p:sp>
+      <p:sp>
+        <p:nvSpPr>
+          <p:cNvPr id="7" name="TextBox 6"/>
+          <p:cNvSpPr txBox="1"/>
+          <p:nvPr/>
+        </p:nvSpPr>
+        <p:spPr>
+          <a:xfrm>
+            <a:off x="2445395" y="2278695"/>
+            <a:ext cx="846836" cy="307777"/>
+          </a:xfrm>
+          <a:prstGeom prst="rect">
+            <a:avLst/>
+          </a:prstGeom>
+          <a:noFill/>
+        </p:spPr>
+        <p:txBody>
+          <a:bodyPr wrap="square" rtlCol="0">
+            <a:spAutoFit/>
+          </a:bodyPr>
+          <a:lstStyle/>
+          <a:p>
+            <a:r>
+              <a:rPr lang="en-US" sz="1400" dirty="0" smtClean="0">
+                <a:latin typeface="Arial"/>
+                <a:cs typeface="Arial"/>
+              </a:rPr>
+              <a:t>FUBAR</a:t>
+            </a:r>
+            <a:endParaRPr lang="en-US" sz="1400" dirty="0">
+              <a:latin typeface="Arial"/>
+              <a:cs typeface="Arial"/>
+            </a:endParaRPr>
+          </a:p>
+        </p:txBody>
+      </p:sp>
+      <p:sp>
+        <p:nvSpPr>
+          <p:cNvPr id="8" name="TextBox 7"/>
+          <p:cNvSpPr txBox="1"/>
+          <p:nvPr/>
+        </p:nvSpPr>
+        <p:spPr>
+          <a:xfrm>
+            <a:off x="6235936" y="2279671"/>
+            <a:ext cx="756167" cy="307777"/>
+          </a:xfrm>
+          <a:prstGeom prst="rect">
+            <a:avLst/>
+          </a:prstGeom>
+          <a:noFill/>
+        </p:spPr>
+        <p:txBody>
+          <a:bodyPr wrap="square" rtlCol="0">
+            <a:spAutoFit/>
+          </a:bodyPr>
+          <a:lstStyle/>
+          <a:p>
+            <a:r>
+              <a:rPr lang="en-US" sz="1400" dirty="0" smtClean="0">
+                <a:latin typeface="Arial"/>
+                <a:cs typeface="Arial"/>
+              </a:rPr>
+              <a:t>PAML</a:t>
+            </a:r>
+            <a:endParaRPr lang="en-US" sz="1400" dirty="0">
               <a:latin typeface="Arial"/>
               <a:cs typeface="Arial"/>
             </a:endParaRPr>

</xml_diff>